<commit_message>
Project 02 first submission
</commit_message>
<xml_diff>
--- a/Project_02_Operationalizing_ML_Models/screenshots/Architecture.pptx
+++ b/Project_02_Operationalizing_ML_Models/screenshots/Architecture.pptx
@@ -3335,7 +3335,7 @@
         </p:nvSpPr>
         <p:spPr>
           <a:xfrm>
-            <a:off x="4625440" y="642403"/>
+            <a:off x="4625440" y="321768"/>
             <a:ext cx="1941608" cy="3054023"/>
           </a:xfrm>
           <a:prstGeom prst="rect">
@@ -3384,7 +3384,7 @@
         </p:nvSpPr>
         <p:spPr>
           <a:xfrm>
-            <a:off x="308759" y="593766"/>
+            <a:off x="308759" y="273131"/>
             <a:ext cx="1721922" cy="581891"/>
           </a:xfrm>
           <a:prstGeom prst="roundRect">
@@ -3440,7 +3440,7 @@
         </p:nvSpPr>
         <p:spPr>
           <a:xfrm>
-            <a:off x="2604651" y="564671"/>
+            <a:off x="2604651" y="244036"/>
             <a:ext cx="1721922" cy="640080"/>
           </a:xfrm>
           <a:prstGeom prst="roundRect">
@@ -3496,7 +3496,7 @@
         </p:nvCxnSpPr>
         <p:spPr>
           <a:xfrm flipV="1">
-            <a:off x="2030681" y="884711"/>
+            <a:off x="2030681" y="564076"/>
             <a:ext cx="573970" cy="1"/>
           </a:xfrm>
           <a:prstGeom prst="bentConnector3">
@@ -3535,7 +3535,7 @@
         </p:nvSpPr>
         <p:spPr>
           <a:xfrm>
-            <a:off x="2610589" y="2036239"/>
+            <a:off x="2610589" y="1715604"/>
             <a:ext cx="1721922" cy="640080"/>
           </a:xfrm>
           <a:prstGeom prst="roundRect">
@@ -3591,7 +3591,7 @@
         </p:nvCxnSpPr>
         <p:spPr>
           <a:xfrm rot="16200000" flipH="1">
-            <a:off x="3052837" y="1617526"/>
+            <a:off x="3052837" y="1296891"/>
             <a:ext cx="831488" cy="5938"/>
           </a:xfrm>
           <a:prstGeom prst="bentConnector3">
@@ -3630,7 +3630,7 @@
         </p:nvSpPr>
         <p:spPr>
           <a:xfrm>
-            <a:off x="4751693" y="1187168"/>
+            <a:off x="4751693" y="866533"/>
             <a:ext cx="1721922" cy="640080"/>
           </a:xfrm>
           <a:prstGeom prst="roundRect">
@@ -3679,7 +3679,7 @@
         </p:nvSpPr>
         <p:spPr>
           <a:xfrm>
-            <a:off x="4751693" y="2035860"/>
+            <a:off x="4751693" y="1715225"/>
             <a:ext cx="1721922" cy="640080"/>
           </a:xfrm>
           <a:prstGeom prst="roundRect">
@@ -3728,7 +3728,7 @@
         </p:nvSpPr>
         <p:spPr>
           <a:xfrm>
-            <a:off x="4751693" y="2884552"/>
+            <a:off x="4751693" y="2563917"/>
             <a:ext cx="1721922" cy="640080"/>
           </a:xfrm>
           <a:prstGeom prst="roundRect">
@@ -3780,7 +3780,7 @@
         </p:nvCxnSpPr>
         <p:spPr>
           <a:xfrm flipV="1">
-            <a:off x="4332511" y="1507208"/>
+            <a:off x="4332511" y="1186573"/>
             <a:ext cx="419182" cy="849071"/>
           </a:xfrm>
           <a:prstGeom prst="bentConnector3">
@@ -3822,7 +3822,7 @@
         </p:nvCxnSpPr>
         <p:spPr>
           <a:xfrm flipV="1">
-            <a:off x="4332511" y="2355900"/>
+            <a:off x="4332511" y="2035265"/>
             <a:ext cx="419182" cy="379"/>
           </a:xfrm>
           <a:prstGeom prst="bentConnector3">
@@ -3864,7 +3864,7 @@
         </p:nvCxnSpPr>
         <p:spPr>
           <a:xfrm>
-            <a:off x="4332511" y="2356279"/>
+            <a:off x="4332511" y="2035644"/>
             <a:ext cx="419182" cy="848313"/>
           </a:xfrm>
           <a:prstGeom prst="bentConnector3">
@@ -3903,7 +3903,7 @@
         </p:nvSpPr>
         <p:spPr>
           <a:xfrm>
-            <a:off x="6812475" y="2035695"/>
+            <a:off x="6812475" y="1715060"/>
             <a:ext cx="1721922" cy="640080"/>
           </a:xfrm>
           <a:prstGeom prst="roundRect">
@@ -3955,7 +3955,7 @@
         </p:nvCxnSpPr>
         <p:spPr>
           <a:xfrm>
-            <a:off x="6473615" y="1507208"/>
+            <a:off x="6473615" y="1186573"/>
             <a:ext cx="338860" cy="848527"/>
           </a:xfrm>
           <a:prstGeom prst="bentConnector3">
@@ -3997,7 +3997,7 @@
         </p:nvCxnSpPr>
         <p:spPr>
           <a:xfrm flipV="1">
-            <a:off x="6473615" y="2355735"/>
+            <a:off x="6473615" y="2035100"/>
             <a:ext cx="338860" cy="165"/>
           </a:xfrm>
           <a:prstGeom prst="bentConnector3">
@@ -4039,7 +4039,7 @@
         </p:nvCxnSpPr>
         <p:spPr>
           <a:xfrm flipV="1">
-            <a:off x="6473615" y="2355735"/>
+            <a:off x="6473615" y="2035100"/>
             <a:ext cx="338860" cy="848857"/>
           </a:xfrm>
           <a:prstGeom prst="bentConnector3">
@@ -4078,7 +4078,7 @@
         </p:nvSpPr>
         <p:spPr>
           <a:xfrm>
-            <a:off x="308759" y="2035695"/>
+            <a:off x="308759" y="1715060"/>
             <a:ext cx="1951094" cy="640059"/>
           </a:xfrm>
           <a:prstGeom prst="roundRect">
@@ -4130,7 +4130,7 @@
         </p:nvCxnSpPr>
         <p:spPr>
           <a:xfrm>
-            <a:off x="2259853" y="2355725"/>
+            <a:off x="2259853" y="2035090"/>
             <a:ext cx="350736" cy="554"/>
           </a:xfrm>
           <a:prstGeom prst="bentConnector3">
@@ -4169,7 +4169,7 @@
         </p:nvSpPr>
         <p:spPr>
           <a:xfrm>
-            <a:off x="2598713" y="3696426"/>
+            <a:off x="2598713" y="3375791"/>
             <a:ext cx="1721922" cy="640080"/>
           </a:xfrm>
           <a:prstGeom prst="roundRect">
@@ -4221,7 +4221,7 @@
         </p:nvCxnSpPr>
         <p:spPr>
           <a:xfrm rot="5400000">
-            <a:off x="5326691" y="1669720"/>
+            <a:off x="5326691" y="1349085"/>
             <a:ext cx="1340691" cy="3352801"/>
           </a:xfrm>
           <a:prstGeom prst="bentConnector2">
@@ -4260,7 +4260,7 @@
         </p:nvSpPr>
         <p:spPr>
           <a:xfrm>
-            <a:off x="2604651" y="4656002"/>
+            <a:off x="2604651" y="4335367"/>
             <a:ext cx="1721922" cy="640080"/>
           </a:xfrm>
           <a:prstGeom prst="roundRect">
@@ -4309,7 +4309,7 @@
         </p:nvSpPr>
         <p:spPr>
           <a:xfrm>
-            <a:off x="2610589" y="5615578"/>
+            <a:off x="2610589" y="5294943"/>
             <a:ext cx="1721922" cy="640080"/>
           </a:xfrm>
           <a:prstGeom prst="roundRect">
@@ -4361,7 +4361,7 @@
         </p:nvCxnSpPr>
         <p:spPr>
           <a:xfrm rot="16200000" flipH="1">
-            <a:off x="3302895" y="4493285"/>
+            <a:off x="3302895" y="4172650"/>
             <a:ext cx="319496" cy="5938"/>
           </a:xfrm>
           <a:prstGeom prst="bentConnector3">
@@ -4403,7 +4403,7 @@
         </p:nvCxnSpPr>
         <p:spPr>
           <a:xfrm rot="16200000" flipH="1">
-            <a:off x="3308833" y="5452861"/>
+            <a:off x="3308833" y="5132226"/>
             <a:ext cx="319496" cy="5938"/>
           </a:xfrm>
           <a:prstGeom prst="bentConnector3">
@@ -4442,7 +4442,7 @@
         </p:nvSpPr>
         <p:spPr>
           <a:xfrm>
-            <a:off x="113024" y="5203042"/>
+            <a:off x="113024" y="4882407"/>
             <a:ext cx="1430768" cy="1477027"/>
           </a:xfrm>
           <a:prstGeom prst="roundRect">
@@ -4494,7 +4494,7 @@
         </p:nvCxnSpPr>
         <p:spPr>
           <a:xfrm rot="10800000" flipV="1">
-            <a:off x="1543793" y="5935618"/>
+            <a:off x="1543793" y="5614983"/>
             <a:ext cx="1066797" cy="5938"/>
           </a:xfrm>
           <a:prstGeom prst="bentConnector3">

</xml_diff>